<commit_message>
Update Group5 Prototype Presentation.pptx
update powerpoint
</commit_message>
<xml_diff>
--- a/Group5 Prototype Presentation.pptx
+++ b/Group5 Prototype Presentation.pptx
@@ -6208,6 +6208,26 @@
               <a:t>Group 5</a:t>
             </a:r>
           </a:p>
+          <a:p>
+            <a:pPr algn="ctr"/>
+            <a:r>
+              <a:rPr lang="en-US" dirty="0"/>
+              <a:t>Benjamin Rahman, Neil </a:t>
+            </a:r>
+            <a:r>
+              <a:rPr lang="en-US" dirty="0" err="1"/>
+              <a:t>pirch</a:t>
+            </a:r>
+            <a:r>
+              <a:rPr lang="en-US" dirty="0"/>
+              <a:t>, </a:t>
+            </a:r>
+            <a:r>
+              <a:rPr lang="en-US"/>
+              <a:t>Donald Merrill</a:t>
+            </a:r>
+            <a:endParaRPr lang="en-US" dirty="0"/>
+          </a:p>
         </p:txBody>
       </p:sp>
     </p:spTree>

</xml_diff>